<commit_message>
Slides about the domain
</commit_message>
<xml_diff>
--- a/JodelAlert.pptx
+++ b/JodelAlert.pptx
@@ -7,6 +7,8 @@
   <p:sldIdLst>
     <p:sldId id="256" r:id="rId2"/>
     <p:sldId id="257" r:id="rId3"/>
+    <p:sldId id="258" r:id="rId4"/>
+    <p:sldId id="259" r:id="rId5"/>
   </p:sldIdLst>
   <p:sldSz cx="9144000" cy="6858000" type="screen4x3"/>
   <p:notesSz cx="6858000" cy="9144000"/>
@@ -2755,6 +2757,271 @@
 </p:sld>
 </file>
 
+<file path=ppt/slides/slide3.xml><?xml version="1.0" encoding="utf-8"?>
+<p:sld xmlns:a="http://schemas.openxmlformats.org/drawingml/2006/main" xmlns:r="http://schemas.openxmlformats.org/officeDocument/2006/relationships" xmlns:p="http://schemas.openxmlformats.org/presentationml/2006/main">
+  <p:cSld>
+    <p:spTree>
+      <p:nvGrpSpPr>
+        <p:cNvPr id="1" name=""/>
+        <p:cNvGrpSpPr/>
+        <p:nvPr/>
+      </p:nvGrpSpPr>
+      <p:grpSpPr>
+        <a:xfrm>
+          <a:off x="0" y="0"/>
+          <a:ext cx="0" cy="0"/>
+          <a:chOff x="0" y="0"/>
+          <a:chExt cx="0" cy="0"/>
+        </a:xfrm>
+      </p:grpSpPr>
+      <p:sp>
+        <p:nvSpPr>
+          <p:cNvPr id="2" name="Title 1"/>
+          <p:cNvSpPr>
+            <a:spLocks noGrp="1"/>
+          </p:cNvSpPr>
+          <p:nvPr>
+            <p:ph type="title"/>
+          </p:nvPr>
+        </p:nvSpPr>
+        <p:spPr/>
+        <p:txBody>
+          <a:bodyPr/>
+          <a:lstStyle/>
+          <a:p>
+            <a:r>
+              <a:rPr lang="sv-SE" dirty="0" smtClean="0">
+                <a:latin typeface="Arial Unicode MS" panose="020B0604020202020204" pitchFamily="34" charset="-128"/>
+                <a:ea typeface="Arial Unicode MS" panose="020B0604020202020204" pitchFamily="34" charset="-128"/>
+                <a:cs typeface="Arial Unicode MS" panose="020B0604020202020204" pitchFamily="34" charset="-128"/>
+              </a:rPr>
+              <a:t>Jodel</a:t>
+            </a:r>
+            <a:endParaRPr lang="en-US" dirty="0">
+              <a:latin typeface="Arial Unicode MS" panose="020B0604020202020204" pitchFamily="34" charset="-128"/>
+              <a:ea typeface="Arial Unicode MS" panose="020B0604020202020204" pitchFamily="34" charset="-128"/>
+              <a:cs typeface="Arial Unicode MS" panose="020B0604020202020204" pitchFamily="34" charset="-128"/>
+            </a:endParaRPr>
+          </a:p>
+        </p:txBody>
+      </p:sp>
+      <p:sp>
+        <p:nvSpPr>
+          <p:cNvPr id="3" name="Content Placeholder 2"/>
+          <p:cNvSpPr>
+            <a:spLocks noGrp="1"/>
+          </p:cNvSpPr>
+          <p:nvPr>
+            <p:ph idx="1"/>
+          </p:nvPr>
+        </p:nvSpPr>
+        <p:spPr/>
+        <p:txBody>
+          <a:bodyPr/>
+          <a:lstStyle/>
+          <a:p>
+            <a:r>
+              <a:rPr lang="sv-SE" dirty="0" smtClean="0">
+                <a:latin typeface="Arial Unicode MS" panose="020B0604020202020204" pitchFamily="34" charset="-128"/>
+                <a:ea typeface="Arial Unicode MS" panose="020B0604020202020204" pitchFamily="34" charset="-128"/>
+                <a:cs typeface="Arial Unicode MS" panose="020B0604020202020204" pitchFamily="34" charset="-128"/>
+              </a:rPr>
+              <a:t>An anonymous social application that targets students and campus life</a:t>
+            </a:r>
+          </a:p>
+          <a:p>
+            <a:endParaRPr lang="sv-SE" dirty="0" smtClean="0"/>
+          </a:p>
+          <a:p>
+            <a:endParaRPr lang="sv-SE" dirty="0"/>
+          </a:p>
+        </p:txBody>
+      </p:sp>
+    </p:spTree>
+    <p:extLst>
+      <p:ext uri="{BB962C8B-B14F-4D97-AF65-F5344CB8AC3E}">
+        <p14:creationId xmlns:p14="http://schemas.microsoft.com/office/powerpoint/2010/main" val="1621843957"/>
+      </p:ext>
+    </p:extLst>
+  </p:cSld>
+  <p:clrMapOvr>
+    <a:masterClrMapping/>
+  </p:clrMapOvr>
+</p:sld>
+</file>
+
+<file path=ppt/slides/slide4.xml><?xml version="1.0" encoding="utf-8"?>
+<p:sld xmlns:a="http://schemas.openxmlformats.org/drawingml/2006/main" xmlns:r="http://schemas.openxmlformats.org/officeDocument/2006/relationships" xmlns:p="http://schemas.openxmlformats.org/presentationml/2006/main">
+  <p:cSld>
+    <p:spTree>
+      <p:nvGrpSpPr>
+        <p:cNvPr id="1" name=""/>
+        <p:cNvGrpSpPr/>
+        <p:nvPr/>
+      </p:nvGrpSpPr>
+      <p:grpSpPr>
+        <a:xfrm>
+          <a:off x="0" y="0"/>
+          <a:ext cx="0" cy="0"/>
+          <a:chOff x="0" y="0"/>
+          <a:chExt cx="0" cy="0"/>
+        </a:xfrm>
+      </p:grpSpPr>
+      <p:sp>
+        <p:nvSpPr>
+          <p:cNvPr id="2" name="Title 1"/>
+          <p:cNvSpPr>
+            <a:spLocks noGrp="1"/>
+          </p:cNvSpPr>
+          <p:nvPr>
+            <p:ph type="title"/>
+          </p:nvPr>
+        </p:nvSpPr>
+        <p:spPr/>
+        <p:txBody>
+          <a:bodyPr/>
+          <a:lstStyle/>
+          <a:p>
+            <a:r>
+              <a:rPr lang="sv-SE" dirty="0" smtClean="0">
+                <a:latin typeface="Arial Unicode MS" panose="020B0604020202020204" pitchFamily="34" charset="-128"/>
+                <a:ea typeface="Arial Unicode MS" panose="020B0604020202020204" pitchFamily="34" charset="-128"/>
+                <a:cs typeface="Arial Unicode MS" panose="020B0604020202020204" pitchFamily="34" charset="-128"/>
+              </a:rPr>
+              <a:t>Jodel Alert</a:t>
+            </a:r>
+            <a:endParaRPr lang="en-US" dirty="0">
+              <a:latin typeface="Arial Unicode MS" panose="020B0604020202020204" pitchFamily="34" charset="-128"/>
+              <a:ea typeface="Arial Unicode MS" panose="020B0604020202020204" pitchFamily="34" charset="-128"/>
+              <a:cs typeface="Arial Unicode MS" panose="020B0604020202020204" pitchFamily="34" charset="-128"/>
+            </a:endParaRPr>
+          </a:p>
+        </p:txBody>
+      </p:sp>
+      <p:sp>
+        <p:nvSpPr>
+          <p:cNvPr id="3" name="Content Placeholder 2"/>
+          <p:cNvSpPr>
+            <a:spLocks noGrp="1"/>
+          </p:cNvSpPr>
+          <p:nvPr>
+            <p:ph idx="1"/>
+          </p:nvPr>
+        </p:nvSpPr>
+        <p:spPr/>
+        <p:txBody>
+          <a:bodyPr/>
+          <a:lstStyle/>
+          <a:p>
+            <a:r>
+              <a:rPr lang="sv-SE" dirty="0">
+                <a:latin typeface="Arial Unicode MS" panose="020B0604020202020204" pitchFamily="34" charset="-128"/>
+                <a:ea typeface="Arial Unicode MS" panose="020B0604020202020204" pitchFamily="34" charset="-128"/>
+                <a:cs typeface="Arial Unicode MS" panose="020B0604020202020204" pitchFamily="34" charset="-128"/>
+              </a:rPr>
+              <a:t>Linnéstudenterna wants to tap into the feed and get an alert when someone posts about accomodation, exams, cheating and students getting mistreated from the university </a:t>
+            </a:r>
+            <a:r>
+              <a:rPr lang="sv-SE" dirty="0" smtClean="0">
+                <a:latin typeface="Arial Unicode MS" panose="020B0604020202020204" pitchFamily="34" charset="-128"/>
+                <a:ea typeface="Arial Unicode MS" panose="020B0604020202020204" pitchFamily="34" charset="-128"/>
+                <a:cs typeface="Arial Unicode MS" panose="020B0604020202020204" pitchFamily="34" charset="-128"/>
+              </a:rPr>
+              <a:t>etc (keywords)</a:t>
+            </a:r>
+            <a:endParaRPr lang="sv-SE" dirty="0">
+              <a:latin typeface="Arial Unicode MS" panose="020B0604020202020204" pitchFamily="34" charset="-128"/>
+              <a:ea typeface="Arial Unicode MS" panose="020B0604020202020204" pitchFamily="34" charset="-128"/>
+              <a:cs typeface="Arial Unicode MS" panose="020B0604020202020204" pitchFamily="34" charset="-128"/>
+            </a:endParaRPr>
+          </a:p>
+          <a:p>
+            <a:endParaRPr lang="sv-SE" dirty="0">
+              <a:latin typeface="Arial Unicode MS" panose="020B0604020202020204" pitchFamily="34" charset="-128"/>
+              <a:ea typeface="Arial Unicode MS" panose="020B0604020202020204" pitchFamily="34" charset="-128"/>
+              <a:cs typeface="Arial Unicode MS" panose="020B0604020202020204" pitchFamily="34" charset="-128"/>
+            </a:endParaRPr>
+          </a:p>
+          <a:p>
+            <a:r>
+              <a:rPr lang="sv-SE" dirty="0" smtClean="0">
+                <a:latin typeface="Arial Unicode MS" panose="020B0604020202020204" pitchFamily="34" charset="-128"/>
+                <a:ea typeface="Arial Unicode MS" panose="020B0604020202020204" pitchFamily="34" charset="-128"/>
+                <a:cs typeface="Arial Unicode MS" panose="020B0604020202020204" pitchFamily="34" charset="-128"/>
+              </a:rPr>
+              <a:t>Jodel Alert will </a:t>
+            </a:r>
+            <a:r>
+              <a:rPr lang="sv-SE" dirty="0">
+                <a:latin typeface="Arial Unicode MS" panose="020B0604020202020204" pitchFamily="34" charset="-128"/>
+                <a:ea typeface="Arial Unicode MS" panose="020B0604020202020204" pitchFamily="34" charset="-128"/>
+                <a:cs typeface="Arial Unicode MS" panose="020B0604020202020204" pitchFamily="34" charset="-128"/>
+              </a:rPr>
+              <a:t>send Linnéstudenterna an email when such post is </a:t>
+            </a:r>
+            <a:r>
+              <a:rPr lang="sv-SE" dirty="0" smtClean="0">
+                <a:latin typeface="Arial Unicode MS" panose="020B0604020202020204" pitchFamily="34" charset="-128"/>
+                <a:ea typeface="Arial Unicode MS" panose="020B0604020202020204" pitchFamily="34" charset="-128"/>
+                <a:cs typeface="Arial Unicode MS" panose="020B0604020202020204" pitchFamily="34" charset="-128"/>
+              </a:rPr>
+              <a:t>found</a:t>
+            </a:r>
+          </a:p>
+          <a:p>
+            <a:endParaRPr lang="sv-SE" dirty="0">
+              <a:latin typeface="Arial Unicode MS" panose="020B0604020202020204" pitchFamily="34" charset="-128"/>
+              <a:ea typeface="Arial Unicode MS" panose="020B0604020202020204" pitchFamily="34" charset="-128"/>
+              <a:cs typeface="Arial Unicode MS" panose="020B0604020202020204" pitchFamily="34" charset="-128"/>
+            </a:endParaRPr>
+          </a:p>
+          <a:p>
+            <a:r>
+              <a:rPr lang="sv-SE" dirty="0" smtClean="0">
+                <a:latin typeface="Arial Unicode MS" panose="020B0604020202020204" pitchFamily="34" charset="-128"/>
+                <a:ea typeface="Arial Unicode MS" panose="020B0604020202020204" pitchFamily="34" charset="-128"/>
+                <a:cs typeface="Arial Unicode MS" panose="020B0604020202020204" pitchFamily="34" charset="-128"/>
+              </a:rPr>
+              <a:t>Today Linnéstudenterna searches the feed manually when given time</a:t>
+            </a:r>
+          </a:p>
+          <a:p>
+            <a:endParaRPr lang="sv-SE" dirty="0">
+              <a:latin typeface="Arial Unicode MS" panose="020B0604020202020204" pitchFamily="34" charset="-128"/>
+              <a:ea typeface="Arial Unicode MS" panose="020B0604020202020204" pitchFamily="34" charset="-128"/>
+              <a:cs typeface="Arial Unicode MS" panose="020B0604020202020204" pitchFamily="34" charset="-128"/>
+            </a:endParaRPr>
+          </a:p>
+          <a:p>
+            <a:r>
+              <a:rPr lang="sv-SE" dirty="0" smtClean="0">
+                <a:latin typeface="Arial Unicode MS" panose="020B0604020202020204" pitchFamily="34" charset="-128"/>
+                <a:ea typeface="Arial Unicode MS" panose="020B0604020202020204" pitchFamily="34" charset="-128"/>
+                <a:cs typeface="Arial Unicode MS" panose="020B0604020202020204" pitchFamily="34" charset="-128"/>
+              </a:rPr>
+              <a:t>Other companies can also benefit from this, in order to see what is trending for that company or what is said in general public by common man about that company</a:t>
+            </a:r>
+            <a:endParaRPr lang="en-US" dirty="0">
+              <a:latin typeface="Arial Unicode MS" panose="020B0604020202020204" pitchFamily="34" charset="-128"/>
+              <a:ea typeface="Arial Unicode MS" panose="020B0604020202020204" pitchFamily="34" charset="-128"/>
+              <a:cs typeface="Arial Unicode MS" panose="020B0604020202020204" pitchFamily="34" charset="-128"/>
+            </a:endParaRPr>
+          </a:p>
+        </p:txBody>
+      </p:sp>
+    </p:spTree>
+    <p:extLst>
+      <p:ext uri="{BB962C8B-B14F-4D97-AF65-F5344CB8AC3E}">
+        <p14:creationId xmlns:p14="http://schemas.microsoft.com/office/powerpoint/2010/main" val="2170090029"/>
+      </p:ext>
+    </p:extLst>
+  </p:cSld>
+  <p:clrMapOvr>
+    <a:masterClrMapping/>
+  </p:clrMapOvr>
+</p:sld>
+</file>
+
 <file path=ppt/theme/theme1.xml><?xml version="1.0" encoding="utf-8"?>
 <a:theme xmlns:a="http://schemas.openxmlformats.org/drawingml/2006/main" name="1_Office Theme">
   <a:themeElements>
@@ -3141,7 +3408,7 @@
   </a:extraClrSchemeLst>
   <a:extLst>
     <a:ext uri="{05A4C25C-085E-4340-85A3-A5531E510DB2}">
-      <thm15:themeFamily xmlns:thm15="http://schemas.microsoft.com/office/thememl/2012/main" name="Office Theme" id="{62F939B6-93AF-4DB8-9C6B-D6C7DFDC589F}" vid="{4A3C46E8-61CC-4603-A589-7422A47A8E4A}"/>
+      <thm15:themeFamily xmlns:thm15="http://schemas.microsoft.com/office/thememl/2012/main" xmlns="" name="Office Theme" id="{62F939B6-93AF-4DB8-9C6B-D6C7DFDC589F}" vid="{4A3C46E8-61CC-4603-A589-7422A47A8E4A}"/>
     </a:ext>
   </a:extLst>
 </a:theme>

</xml_diff>